<commit_message>
handle ercursive packs in one line
</commit_message>
<xml_diff>
--- a/UML.pptx
+++ b/UML.pptx
@@ -107,6 +107,11 @@
       </a:defRPr>
     </a:lvl9pPr>
   </p:defaultTextStyle>
+  <p:extLst>
+    <p:ext uri="{EFAFB233-063F-42B5-8137-9DF3F51BA10A}">
+      <p15:sldGuideLst xmlns:p15="http://schemas.microsoft.com/office/powerpoint/2012/main"/>
+    </p:ext>
+  </p:extLst>
 </p:presentation>
 </file>
 
@@ -259,7 +264,7 @@
           <a:p>
             <a:fld id="{9C913F65-E459-4580-8E59-B917F03CBEBF}" type="datetimeFigureOut">
               <a:rPr lang="en-IL" smtClean="0"/>
-              <a:t>13/08/2024</a:t>
+              <a:t>20/08/2024</a:t>
             </a:fld>
             <a:endParaRPr lang="en-IL"/>
           </a:p>
@@ -459,7 +464,7 @@
           <a:p>
             <a:fld id="{9C913F65-E459-4580-8E59-B917F03CBEBF}" type="datetimeFigureOut">
               <a:rPr lang="en-IL" smtClean="0"/>
-              <a:t>13/08/2024</a:t>
+              <a:t>20/08/2024</a:t>
             </a:fld>
             <a:endParaRPr lang="en-IL"/>
           </a:p>
@@ -669,7 +674,7 @@
           <a:p>
             <a:fld id="{9C913F65-E459-4580-8E59-B917F03CBEBF}" type="datetimeFigureOut">
               <a:rPr lang="en-IL" smtClean="0"/>
-              <a:t>13/08/2024</a:t>
+              <a:t>20/08/2024</a:t>
             </a:fld>
             <a:endParaRPr lang="en-IL"/>
           </a:p>
@@ -869,7 +874,7 @@
           <a:p>
             <a:fld id="{9C913F65-E459-4580-8E59-B917F03CBEBF}" type="datetimeFigureOut">
               <a:rPr lang="en-IL" smtClean="0"/>
-              <a:t>13/08/2024</a:t>
+              <a:t>20/08/2024</a:t>
             </a:fld>
             <a:endParaRPr lang="en-IL"/>
           </a:p>
@@ -1145,7 +1150,7 @@
           <a:p>
             <a:fld id="{9C913F65-E459-4580-8E59-B917F03CBEBF}" type="datetimeFigureOut">
               <a:rPr lang="en-IL" smtClean="0"/>
-              <a:t>13/08/2024</a:t>
+              <a:t>20/08/2024</a:t>
             </a:fld>
             <a:endParaRPr lang="en-IL"/>
           </a:p>
@@ -1413,7 +1418,7 @@
           <a:p>
             <a:fld id="{9C913F65-E459-4580-8E59-B917F03CBEBF}" type="datetimeFigureOut">
               <a:rPr lang="en-IL" smtClean="0"/>
-              <a:t>13/08/2024</a:t>
+              <a:t>20/08/2024</a:t>
             </a:fld>
             <a:endParaRPr lang="en-IL"/>
           </a:p>
@@ -1828,7 +1833,7 @@
           <a:p>
             <a:fld id="{9C913F65-E459-4580-8E59-B917F03CBEBF}" type="datetimeFigureOut">
               <a:rPr lang="en-IL" smtClean="0"/>
-              <a:t>13/08/2024</a:t>
+              <a:t>20/08/2024</a:t>
             </a:fld>
             <a:endParaRPr lang="en-IL"/>
           </a:p>
@@ -1970,7 +1975,7 @@
           <a:p>
             <a:fld id="{9C913F65-E459-4580-8E59-B917F03CBEBF}" type="datetimeFigureOut">
               <a:rPr lang="en-IL" smtClean="0"/>
-              <a:t>13/08/2024</a:t>
+              <a:t>20/08/2024</a:t>
             </a:fld>
             <a:endParaRPr lang="en-IL"/>
           </a:p>
@@ -2083,7 +2088,7 @@
           <a:p>
             <a:fld id="{9C913F65-E459-4580-8E59-B917F03CBEBF}" type="datetimeFigureOut">
               <a:rPr lang="en-IL" smtClean="0"/>
-              <a:t>13/08/2024</a:t>
+              <a:t>20/08/2024</a:t>
             </a:fld>
             <a:endParaRPr lang="en-IL"/>
           </a:p>
@@ -2396,7 +2401,7 @@
           <a:p>
             <a:fld id="{9C913F65-E459-4580-8E59-B917F03CBEBF}" type="datetimeFigureOut">
               <a:rPr lang="en-IL" smtClean="0"/>
-              <a:t>13/08/2024</a:t>
+              <a:t>20/08/2024</a:t>
             </a:fld>
             <a:endParaRPr lang="en-IL"/>
           </a:p>
@@ -2685,7 +2690,7 @@
           <a:p>
             <a:fld id="{9C913F65-E459-4580-8E59-B917F03CBEBF}" type="datetimeFigureOut">
               <a:rPr lang="en-IL" smtClean="0"/>
-              <a:t>13/08/2024</a:t>
+              <a:t>20/08/2024</a:t>
             </a:fld>
             <a:endParaRPr lang="en-IL"/>
           </a:p>
@@ -2928,7 +2933,7 @@
           <a:p>
             <a:fld id="{9C913F65-E459-4580-8E59-B917F03CBEBF}" type="datetimeFigureOut">
               <a:rPr lang="en-IL" smtClean="0"/>
-              <a:t>13/08/2024</a:t>
+              <a:t>20/08/2024</a:t>
             </a:fld>
             <a:endParaRPr lang="en-IL"/>
           </a:p>
@@ -5403,7 +5408,7 @@
             <a:p>
               <a:pPr algn="ctr"/>
               <a:r>
-                <a:rPr lang="en-GB">
+                <a:rPr lang="en-GB" dirty="0">
                   <a:solidFill>
                     <a:schemeClr val="tx1"/>
                   </a:solidFill>
@@ -5556,10 +5561,10 @@
         </p:nvGrpSpPr>
         <p:grpSpPr>
           <a:xfrm>
-            <a:off x="5059018" y="248752"/>
-            <a:ext cx="4199560" cy="4686161"/>
+            <a:off x="5034170" y="212262"/>
+            <a:ext cx="3525301" cy="4686161"/>
             <a:chOff x="598005" y="584979"/>
-            <a:chExt cx="4199560" cy="4686161"/>
+            <a:chExt cx="3525301" cy="4686161"/>
           </a:xfrm>
         </p:grpSpPr>
         <p:sp>
@@ -5612,65 +5617,6 @@
                   </a:solidFill>
                 </a:rPr>
                 <a:t>MonsterFactory</a:t>
-              </a:r>
-              <a:endParaRPr lang="en-IL" dirty="0">
-                <a:solidFill>
-                  <a:schemeClr val="tx1"/>
-                </a:solidFill>
-              </a:endParaRPr>
-            </a:p>
-          </p:txBody>
-        </p:sp>
-        <p:sp>
-          <p:nvSpPr>
-            <p:cNvPr id="37" name="Rectangle 36">
-              <a:extLst>
-                <a:ext uri="{FF2B5EF4-FFF2-40B4-BE49-F238E27FC236}">
-                  <a16:creationId xmlns:a16="http://schemas.microsoft.com/office/drawing/2014/main" id="{ECCBE7FD-E01F-F45F-C0FC-250BF03F9F0B}"/>
-                </a:ext>
-              </a:extLst>
-            </p:cNvPr>
-            <p:cNvSpPr/>
-            <p:nvPr/>
-          </p:nvSpPr>
-          <p:spPr>
-            <a:xfrm>
-              <a:off x="3288135" y="1915109"/>
-              <a:ext cx="1509430" cy="730525"/>
-            </a:xfrm>
-            <a:prstGeom prst="rect">
-              <a:avLst/>
-            </a:prstGeom>
-            <a:noFill/>
-          </p:spPr>
-          <p:style>
-            <a:lnRef idx="2">
-              <a:schemeClr val="accent1">
-                <a:shade val="15000"/>
-              </a:schemeClr>
-            </a:lnRef>
-            <a:fillRef idx="1">
-              <a:schemeClr val="accent1"/>
-            </a:fillRef>
-            <a:effectRef idx="0">
-              <a:schemeClr val="accent1"/>
-            </a:effectRef>
-            <a:fontRef idx="minor">
-              <a:schemeClr val="lt1"/>
-            </a:fontRef>
-          </p:style>
-          <p:txBody>
-            <a:bodyPr rtlCol="0" anchor="ctr"/>
-            <a:lstStyle/>
-            <a:p>
-              <a:pPr algn="ctr"/>
-              <a:r>
-                <a:rPr lang="en-GB" sz="1400" dirty="0">
-                  <a:solidFill>
-                    <a:schemeClr val="tx1"/>
-                  </a:solidFill>
-                </a:rPr>
-                <a:t>PackOfMonstersFactory</a:t>
               </a:r>
               <a:endParaRPr lang="en-IL" dirty="0">
                 <a:solidFill>
@@ -5841,49 +5787,6 @@
             </a:fontRef>
           </p:style>
         </p:cxnSp>
-        <p:cxnSp>
-          <p:nvCxnSpPr>
-            <p:cNvPr id="41" name="Connector: Elbow 40">
-              <a:extLst>
-                <a:ext uri="{FF2B5EF4-FFF2-40B4-BE49-F238E27FC236}">
-                  <a16:creationId xmlns:a16="http://schemas.microsoft.com/office/drawing/2014/main" id="{A073D30E-449C-82E6-A0DB-0FCAD6C0226F}"/>
-                </a:ext>
-              </a:extLst>
-            </p:cNvPr>
-            <p:cNvCxnSpPr>
-              <a:cxnSpLocks/>
-            </p:cNvCxnSpPr>
-            <p:nvPr/>
-          </p:nvCxnSpPr>
-          <p:spPr>
-            <a:xfrm rot="16200000" flipH="1">
-              <a:off x="3275712" y="1316280"/>
-              <a:ext cx="611252" cy="586406"/>
-            </a:xfrm>
-            <a:prstGeom prst="bentConnector3">
-              <a:avLst>
-                <a:gd name="adj1" fmla="val 50000"/>
-              </a:avLst>
-            </a:prstGeom>
-            <a:ln>
-              <a:tailEnd type="triangle"/>
-            </a:ln>
-          </p:spPr>
-          <p:style>
-            <a:lnRef idx="2">
-              <a:schemeClr val="accent1"/>
-            </a:lnRef>
-            <a:fillRef idx="0">
-              <a:schemeClr val="accent1"/>
-            </a:fillRef>
-            <a:effectRef idx="1">
-              <a:schemeClr val="accent1"/>
-            </a:effectRef>
-            <a:fontRef idx="minor">
-              <a:schemeClr val="tx1"/>
-            </a:fontRef>
-          </p:style>
-        </p:cxnSp>
         <p:sp>
           <p:nvSpPr>
             <p:cNvPr id="42" name="Rectangle 41">
@@ -6126,6 +6029,50 @@
           </p:style>
         </p:cxnSp>
       </p:grpSp>
+      <p:cxnSp>
+        <p:nvCxnSpPr>
+          <p:cNvPr id="10" name="Connector: Elbow 9">
+            <a:extLst>
+              <a:ext uri="{FF2B5EF4-FFF2-40B4-BE49-F238E27FC236}">
+                <a16:creationId xmlns:a16="http://schemas.microsoft.com/office/drawing/2014/main" id="{C5B6CB97-BA1A-5445-4897-B87F0B24B203}"/>
+              </a:ext>
+            </a:extLst>
+          </p:cNvPr>
+          <p:cNvCxnSpPr>
+            <a:stCxn id="6" idx="3"/>
+            <a:endCxn id="5" idx="3"/>
+          </p:cNvCxnSpPr>
+          <p:nvPr/>
+        </p:nvCxnSpPr>
+        <p:spPr>
+          <a:xfrm flipH="1" flipV="1">
+            <a:off x="2704519" y="565878"/>
+            <a:ext cx="1412215" cy="1341777"/>
+          </a:xfrm>
+          <a:prstGeom prst="bentConnector3">
+            <a:avLst>
+              <a:gd name="adj1" fmla="val -16187"/>
+            </a:avLst>
+          </a:prstGeom>
+          <a:ln>
+            <a:tailEnd type="triangle"/>
+          </a:ln>
+        </p:spPr>
+        <p:style>
+          <a:lnRef idx="2">
+            <a:schemeClr val="accent1"/>
+          </a:lnRef>
+          <a:fillRef idx="0">
+            <a:schemeClr val="accent1"/>
+          </a:fillRef>
+          <a:effectRef idx="1">
+            <a:schemeClr val="accent1"/>
+          </a:effectRef>
+          <a:fontRef idx="minor">
+            <a:schemeClr val="tx1"/>
+          </a:fontRef>
+        </p:style>
+      </p:cxnSp>
     </p:spTree>
     <p:extLst>
       <p:ext uri="{BB962C8B-B14F-4D97-AF65-F5344CB8AC3E}">
@@ -6170,7 +6117,7 @@
         </p:nvGrpSpPr>
         <p:grpSpPr>
           <a:xfrm>
-            <a:off x="134478" y="200615"/>
+            <a:off x="2758408" y="1259132"/>
             <a:ext cx="3982256" cy="3382704"/>
             <a:chOff x="815309" y="573332"/>
             <a:chExt cx="3982256" cy="3382704"/>
@@ -6521,398 +6468,6 @@
           <p:spPr>
             <a:xfrm flipH="1">
               <a:off x="2979466" y="1299021"/>
-              <a:ext cx="1" cy="1931326"/>
-            </a:xfrm>
-            <a:prstGeom prst="straightConnector1">
-              <a:avLst/>
-            </a:prstGeom>
-            <a:ln>
-              <a:tailEnd type="triangle"/>
-            </a:ln>
-          </p:spPr>
-          <p:style>
-            <a:lnRef idx="2">
-              <a:schemeClr val="accent1"/>
-            </a:lnRef>
-            <a:fillRef idx="0">
-              <a:schemeClr val="accent1"/>
-            </a:fillRef>
-            <a:effectRef idx="1">
-              <a:schemeClr val="accent1"/>
-            </a:effectRef>
-            <a:fontRef idx="minor">
-              <a:schemeClr val="tx1"/>
-            </a:fontRef>
-          </p:style>
-        </p:cxnSp>
-      </p:grpSp>
-      <p:grpSp>
-        <p:nvGrpSpPr>
-          <p:cNvPr id="23" name="Group 22">
-            <a:extLst>
-              <a:ext uri="{FF2B5EF4-FFF2-40B4-BE49-F238E27FC236}">
-                <a16:creationId xmlns:a16="http://schemas.microsoft.com/office/drawing/2014/main" id="{1BBD5FA5-798D-3CAA-357A-B2B3B060876D}"/>
-              </a:ext>
-            </a:extLst>
-          </p:cNvPr>
-          <p:cNvGrpSpPr/>
-          <p:nvPr/>
-        </p:nvGrpSpPr>
-        <p:grpSpPr>
-          <a:xfrm>
-            <a:off x="6042936" y="243783"/>
-            <a:ext cx="3275277" cy="3448740"/>
-            <a:chOff x="1522288" y="584979"/>
-            <a:chExt cx="3275277" cy="3448740"/>
-          </a:xfrm>
-        </p:grpSpPr>
-        <p:sp>
-          <p:nvSpPr>
-            <p:cNvPr id="24" name="Rectangle 23">
-              <a:extLst>
-                <a:ext uri="{FF2B5EF4-FFF2-40B4-BE49-F238E27FC236}">
-                  <a16:creationId xmlns:a16="http://schemas.microsoft.com/office/drawing/2014/main" id="{7A191825-BD28-7D74-E075-3B6D6D89EA37}"/>
-                </a:ext>
-              </a:extLst>
-            </p:cNvPr>
-            <p:cNvSpPr/>
-            <p:nvPr/>
-          </p:nvSpPr>
-          <p:spPr>
-            <a:xfrm>
-              <a:off x="2091364" y="584979"/>
-              <a:ext cx="1840560" cy="730525"/>
-            </a:xfrm>
-            <a:prstGeom prst="rect">
-              <a:avLst/>
-            </a:prstGeom>
-            <a:noFill/>
-            <a:ln>
-              <a:solidFill>
-                <a:schemeClr val="accent1">
-                  <a:lumMod val="60000"/>
-                  <a:lumOff val="40000"/>
-                </a:schemeClr>
-              </a:solidFill>
-            </a:ln>
-          </p:spPr>
-          <p:style>
-            <a:lnRef idx="2">
-              <a:schemeClr val="accent1">
-                <a:shade val="15000"/>
-              </a:schemeClr>
-            </a:lnRef>
-            <a:fillRef idx="1">
-              <a:schemeClr val="accent1"/>
-            </a:fillRef>
-            <a:effectRef idx="0">
-              <a:schemeClr val="accent1"/>
-            </a:effectRef>
-            <a:fontRef idx="minor">
-              <a:schemeClr val="lt1"/>
-            </a:fontRef>
-          </p:style>
-          <p:txBody>
-            <a:bodyPr rtlCol="0" anchor="ctr"/>
-            <a:lstStyle/>
-            <a:p>
-              <a:pPr algn="ctr"/>
-              <a:r>
-                <a:rPr lang="en-GB" dirty="0">
-                  <a:solidFill>
-                    <a:schemeClr val="tx1"/>
-                  </a:solidFill>
-                </a:rPr>
-                <a:t>EventFactory</a:t>
-              </a:r>
-              <a:endParaRPr lang="en-IL" dirty="0">
-                <a:solidFill>
-                  <a:schemeClr val="tx1"/>
-                </a:solidFill>
-              </a:endParaRPr>
-            </a:p>
-          </p:txBody>
-        </p:sp>
-        <p:sp>
-          <p:nvSpPr>
-            <p:cNvPr id="25" name="Rectangle 24">
-              <a:extLst>
-                <a:ext uri="{FF2B5EF4-FFF2-40B4-BE49-F238E27FC236}">
-                  <a16:creationId xmlns:a16="http://schemas.microsoft.com/office/drawing/2014/main" id="{A1A9DEC4-5B38-D80D-B86D-F1D36C8ABBE7}"/>
-                </a:ext>
-              </a:extLst>
-            </p:cNvPr>
-            <p:cNvSpPr/>
-            <p:nvPr/>
-          </p:nvSpPr>
-          <p:spPr>
-            <a:xfrm>
-              <a:off x="3288135" y="1915109"/>
-              <a:ext cx="1509430" cy="730525"/>
-            </a:xfrm>
-            <a:prstGeom prst="rect">
-              <a:avLst/>
-            </a:prstGeom>
-            <a:noFill/>
-          </p:spPr>
-          <p:style>
-            <a:lnRef idx="2">
-              <a:schemeClr val="accent1">
-                <a:shade val="15000"/>
-              </a:schemeClr>
-            </a:lnRef>
-            <a:fillRef idx="1">
-              <a:schemeClr val="accent1"/>
-            </a:fillRef>
-            <a:effectRef idx="0">
-              <a:schemeClr val="accent1"/>
-            </a:effectRef>
-            <a:fontRef idx="minor">
-              <a:schemeClr val="lt1"/>
-            </a:fontRef>
-          </p:style>
-          <p:txBody>
-            <a:bodyPr rtlCol="0" anchor="ctr"/>
-            <a:lstStyle/>
-            <a:p>
-              <a:pPr algn="ctr"/>
-              <a:r>
-                <a:rPr lang="en-GB" sz="1400" dirty="0">
-                  <a:solidFill>
-                    <a:schemeClr val="tx1"/>
-                  </a:solidFill>
-                </a:rPr>
-                <a:t>PotionsMerchantFactory</a:t>
-              </a:r>
-              <a:endParaRPr lang="en-IL" dirty="0">
-                <a:solidFill>
-                  <a:schemeClr val="tx1"/>
-                </a:solidFill>
-              </a:endParaRPr>
-            </a:p>
-          </p:txBody>
-        </p:sp>
-        <p:sp>
-          <p:nvSpPr>
-            <p:cNvPr id="26" name="Rectangle 25">
-              <a:extLst>
-                <a:ext uri="{FF2B5EF4-FFF2-40B4-BE49-F238E27FC236}">
-                  <a16:creationId xmlns:a16="http://schemas.microsoft.com/office/drawing/2014/main" id="{23D541C7-8323-9022-FA97-FC25561ABA7B}"/>
-                </a:ext>
-              </a:extLst>
-            </p:cNvPr>
-            <p:cNvSpPr/>
-            <p:nvPr/>
-          </p:nvSpPr>
-          <p:spPr>
-            <a:xfrm>
-              <a:off x="1522288" y="1856791"/>
-              <a:ext cx="1457179" cy="730525"/>
-            </a:xfrm>
-            <a:prstGeom prst="rect">
-              <a:avLst/>
-            </a:prstGeom>
-            <a:noFill/>
-          </p:spPr>
-          <p:style>
-            <a:lnRef idx="2">
-              <a:schemeClr val="accent1">
-                <a:shade val="15000"/>
-              </a:schemeClr>
-            </a:lnRef>
-            <a:fillRef idx="1">
-              <a:schemeClr val="accent1"/>
-            </a:fillRef>
-            <a:effectRef idx="0">
-              <a:schemeClr val="accent1"/>
-            </a:effectRef>
-            <a:fontRef idx="minor">
-              <a:schemeClr val="lt1"/>
-            </a:fontRef>
-          </p:style>
-          <p:txBody>
-            <a:bodyPr rtlCol="0" anchor="ctr"/>
-            <a:lstStyle/>
-            <a:p>
-              <a:pPr algn="ctr"/>
-              <a:r>
-                <a:rPr lang="en-GB" sz="1050" dirty="0">
-                  <a:solidFill>
-                    <a:schemeClr val="tx1"/>
-                  </a:solidFill>
-                </a:rPr>
-                <a:t>SolarEclipseFactory</a:t>
-              </a:r>
-              <a:endParaRPr lang="en-IL" dirty="0">
-                <a:solidFill>
-                  <a:schemeClr val="tx1"/>
-                </a:solidFill>
-              </a:endParaRPr>
-            </a:p>
-          </p:txBody>
-        </p:sp>
-        <p:cxnSp>
-          <p:nvCxnSpPr>
-            <p:cNvPr id="28" name="Connector: Elbow 27">
-              <a:extLst>
-                <a:ext uri="{FF2B5EF4-FFF2-40B4-BE49-F238E27FC236}">
-                  <a16:creationId xmlns:a16="http://schemas.microsoft.com/office/drawing/2014/main" id="{E35C53C6-6E0D-5000-4AFA-44D89936FCBC}"/>
-                </a:ext>
-              </a:extLst>
-            </p:cNvPr>
-            <p:cNvCxnSpPr>
-              <a:cxnSpLocks/>
-            </p:cNvCxnSpPr>
-            <p:nvPr/>
-          </p:nvCxnSpPr>
-          <p:spPr>
-            <a:xfrm rot="5400000">
-              <a:off x="2251467" y="1421896"/>
-              <a:ext cx="521807" cy="316856"/>
-            </a:xfrm>
-            <a:prstGeom prst="bentConnector3">
-              <a:avLst>
-                <a:gd name="adj1" fmla="val 50000"/>
-              </a:avLst>
-            </a:prstGeom>
-            <a:ln>
-              <a:tailEnd type="triangle"/>
-            </a:ln>
-          </p:spPr>
-          <p:style>
-            <a:lnRef idx="2">
-              <a:schemeClr val="accent1"/>
-            </a:lnRef>
-            <a:fillRef idx="0">
-              <a:schemeClr val="accent1"/>
-            </a:fillRef>
-            <a:effectRef idx="1">
-              <a:schemeClr val="accent1"/>
-            </a:effectRef>
-            <a:fontRef idx="minor">
-              <a:schemeClr val="tx1"/>
-            </a:fontRef>
-          </p:style>
-        </p:cxnSp>
-        <p:cxnSp>
-          <p:nvCxnSpPr>
-            <p:cNvPr id="29" name="Connector: Elbow 28">
-              <a:extLst>
-                <a:ext uri="{FF2B5EF4-FFF2-40B4-BE49-F238E27FC236}">
-                  <a16:creationId xmlns:a16="http://schemas.microsoft.com/office/drawing/2014/main" id="{B67F3BE8-6408-AB7A-F517-2FAED5EEAC3C}"/>
-                </a:ext>
-              </a:extLst>
-            </p:cNvPr>
-            <p:cNvCxnSpPr>
-              <a:cxnSpLocks/>
-            </p:cNvCxnSpPr>
-            <p:nvPr/>
-          </p:nvCxnSpPr>
-          <p:spPr>
-            <a:xfrm rot="16200000" flipH="1">
-              <a:off x="3275712" y="1316280"/>
-              <a:ext cx="611252" cy="586406"/>
-            </a:xfrm>
-            <a:prstGeom prst="bentConnector3">
-              <a:avLst>
-                <a:gd name="adj1" fmla="val 50000"/>
-              </a:avLst>
-            </a:prstGeom>
-            <a:ln>
-              <a:tailEnd type="triangle"/>
-            </a:ln>
-          </p:spPr>
-          <p:style>
-            <a:lnRef idx="2">
-              <a:schemeClr val="accent1"/>
-            </a:lnRef>
-            <a:fillRef idx="0">
-              <a:schemeClr val="accent1"/>
-            </a:fillRef>
-            <a:effectRef idx="1">
-              <a:schemeClr val="accent1"/>
-            </a:effectRef>
-            <a:fontRef idx="minor">
-              <a:schemeClr val="tx1"/>
-            </a:fontRef>
-          </p:style>
-        </p:cxnSp>
-        <p:sp>
-          <p:nvSpPr>
-            <p:cNvPr id="31" name="Rectangle 30">
-              <a:extLst>
-                <a:ext uri="{FF2B5EF4-FFF2-40B4-BE49-F238E27FC236}">
-                  <a16:creationId xmlns:a16="http://schemas.microsoft.com/office/drawing/2014/main" id="{279E3249-BF29-7639-36BF-CFF812B8B73E}"/>
-                </a:ext>
-              </a:extLst>
-            </p:cNvPr>
-            <p:cNvSpPr/>
-            <p:nvPr/>
-          </p:nvSpPr>
-          <p:spPr>
-            <a:xfrm>
-              <a:off x="2720911" y="3303194"/>
-              <a:ext cx="1876775" cy="730525"/>
-            </a:xfrm>
-            <a:prstGeom prst="rect">
-              <a:avLst/>
-            </a:prstGeom>
-            <a:noFill/>
-          </p:spPr>
-          <p:style>
-            <a:lnRef idx="2">
-              <a:schemeClr val="accent1">
-                <a:shade val="15000"/>
-              </a:schemeClr>
-            </a:lnRef>
-            <a:fillRef idx="1">
-              <a:schemeClr val="accent1"/>
-            </a:fillRef>
-            <a:effectRef idx="0">
-              <a:schemeClr val="accent1"/>
-            </a:effectRef>
-            <a:fontRef idx="minor">
-              <a:schemeClr val="lt1"/>
-            </a:fontRef>
-          </p:style>
-          <p:txBody>
-            <a:bodyPr rtlCol="0" anchor="ctr"/>
-            <a:lstStyle/>
-            <a:p>
-              <a:pPr algn="ctr"/>
-              <a:r>
-                <a:rPr lang="en-GB" sz="1400" dirty="0">
-                  <a:solidFill>
-                    <a:schemeClr val="tx1"/>
-                  </a:solidFill>
-                </a:rPr>
-                <a:t>MonsterEventFactory</a:t>
-              </a:r>
-              <a:endParaRPr lang="en-IL" dirty="0">
-                <a:solidFill>
-                  <a:schemeClr val="tx1"/>
-                </a:solidFill>
-              </a:endParaRPr>
-            </a:p>
-          </p:txBody>
-        </p:sp>
-        <p:cxnSp>
-          <p:nvCxnSpPr>
-            <p:cNvPr id="33" name="Straight Arrow Connector 32">
-              <a:extLst>
-                <a:ext uri="{FF2B5EF4-FFF2-40B4-BE49-F238E27FC236}">
-                  <a16:creationId xmlns:a16="http://schemas.microsoft.com/office/drawing/2014/main" id="{57FFDAE0-F871-3766-AB9C-4B968402432F}"/>
-                </a:ext>
-              </a:extLst>
-            </p:cNvPr>
-            <p:cNvCxnSpPr>
-              <a:cxnSpLocks/>
-            </p:cNvCxnSpPr>
-            <p:nvPr/>
-          </p:nvCxnSpPr>
-          <p:spPr>
-            <a:xfrm flipH="1">
-              <a:off x="3132310" y="1315504"/>
               <a:ext cx="1" cy="1931326"/>
             </a:xfrm>
             <a:prstGeom prst="straightConnector1">

</xml_diff>